<commit_message>
Update for Nov 2021
</commit_message>
<xml_diff>
--- a/docs/ElasticsearchShortIntro.pptx
+++ b/docs/ElasticsearchShortIntro.pptx
@@ -5,7 +5,7 @@
     <p:sldMasterId id="2147483648" r:id="rId1"/>
   </p:sldMasterIdLst>
   <p:notesMasterIdLst>
-    <p:notesMasterId r:id="rId26"/>
+    <p:notesMasterId r:id="rId27"/>
   </p:notesMasterIdLst>
   <p:sldIdLst>
     <p:sldId id="256" r:id="rId2"/>
@@ -22,16 +22,17 @@
     <p:sldId id="296" r:id="rId13"/>
     <p:sldId id="297" r:id="rId14"/>
     <p:sldId id="298" r:id="rId15"/>
-    <p:sldId id="258" r:id="rId16"/>
-    <p:sldId id="259" r:id="rId17"/>
-    <p:sldId id="260" r:id="rId18"/>
-    <p:sldId id="284" r:id="rId19"/>
-    <p:sldId id="289" r:id="rId20"/>
-    <p:sldId id="286" r:id="rId21"/>
-    <p:sldId id="288" r:id="rId22"/>
-    <p:sldId id="274" r:id="rId23"/>
-    <p:sldId id="275" r:id="rId24"/>
-    <p:sldId id="299" r:id="rId25"/>
+    <p:sldId id="306" r:id="rId16"/>
+    <p:sldId id="258" r:id="rId17"/>
+    <p:sldId id="259" r:id="rId18"/>
+    <p:sldId id="260" r:id="rId19"/>
+    <p:sldId id="284" r:id="rId20"/>
+    <p:sldId id="289" r:id="rId21"/>
+    <p:sldId id="286" r:id="rId22"/>
+    <p:sldId id="288" r:id="rId23"/>
+    <p:sldId id="274" r:id="rId24"/>
+    <p:sldId id="275" r:id="rId25"/>
+    <p:sldId id="299" r:id="rId26"/>
   </p:sldIdLst>
   <p:sldSz cx="9144000" cy="5143500" type="screen16x9"/>
   <p:notesSz cx="6858000" cy="9144000"/>
@@ -231,7 +232,7 @@
           <a:p>
             <a:fld id="{B0160BEC-550A-4FF5-8A23-3504083A2721}" type="datetimeFigureOut">
               <a:rPr lang="en-US" smtClean="0"/>
-              <a:t>6/23/21</a:t>
+              <a:t>11/15/21</a:t>
             </a:fld>
             <a:endParaRPr lang="en-US" dirty="0"/>
           </a:p>
@@ -723,7 +724,7 @@
             <a:fld id="{D6D87CD5-6B9B-419D-8524-3EE95D82AB73}" type="datetimeFigureOut">
               <a:rPr lang="en-US" smtClean="0"/>
               <a:pPr/>
-              <a:t>6/23/21</a:t>
+              <a:t>11/15/21</a:t>
             </a:fld>
             <a:endParaRPr lang="en-US" dirty="0"/>
           </a:p>
@@ -1939,7 +1940,7 @@
             <a:fld id="{D6D87CD5-6B9B-419D-8524-3EE95D82AB73}" type="datetimeFigureOut">
               <a:rPr lang="en-US" smtClean="0"/>
               <a:pPr/>
-              <a:t>6/23/21</a:t>
+              <a:t>11/15/21</a:t>
             </a:fld>
             <a:endParaRPr lang="en-US" dirty="0"/>
           </a:p>
@@ -3597,7 +3598,12 @@
             <p:ph type="title"/>
           </p:nvPr>
         </p:nvSpPr>
-        <p:spPr/>
+        <p:spPr>
+          <a:xfrm>
+            <a:off x="152400" y="57150"/>
+            <a:ext cx="7772400" cy="613171"/>
+          </a:xfrm>
+        </p:spPr>
         <p:txBody>
           <a:bodyPr/>
           <a:lstStyle/>
@@ -4172,8 +4178,8 @@
           <a:lstStyle/>
           <a:p>
             <a:r>
-              <a:rPr lang="en-US" sz="3200" dirty="0"/>
-              <a:t>What it isn’t</a:t>
+              <a:rPr lang="en-US" sz="2800" dirty="0"/>
+              <a:t>When should you use Elasticsearch</a:t>
             </a:r>
           </a:p>
         </p:txBody>
@@ -4195,13 +4201,112 @@
           <a:p>
             <a:r>
               <a:rPr lang="en-US" dirty="0"/>
-              <a:t>Not a relational database (no table joins)</a:t>
+              <a:t>Full text searches</a:t>
+            </a:r>
+          </a:p>
+          <a:p>
+            <a:r>
+              <a:rPr lang="en-US" dirty="0"/>
+              <a:t>Care about relevancy of documents</a:t>
+            </a:r>
+          </a:p>
+          <a:p>
+            <a:r>
+              <a:rPr lang="en-US" dirty="0"/>
+              <a:t>Can easily scale out to many nodes</a:t>
+            </a:r>
+          </a:p>
+        </p:txBody>
+      </p:sp>
+    </p:spTree>
+    <p:extLst>
+      <p:ext uri="{BB962C8B-B14F-4D97-AF65-F5344CB8AC3E}">
+        <p14:creationId xmlns:p14="http://schemas.microsoft.com/office/powerpoint/2010/main" val="2890149576"/>
+      </p:ext>
+    </p:extLst>
+  </p:cSld>
+  <p:clrMapOvr>
+    <a:masterClrMapping/>
+  </p:clrMapOvr>
+</p:sld>
+</file>
+
+<file path=ppt/slides/slide16.xml><?xml version="1.0" encoding="utf-8"?>
+<p:sld xmlns:a="http://schemas.openxmlformats.org/drawingml/2006/main" xmlns:r="http://schemas.openxmlformats.org/officeDocument/2006/relationships" xmlns:p="http://schemas.openxmlformats.org/presentationml/2006/main">
+  <p:cSld>
+    <p:spTree>
+      <p:nvGrpSpPr>
+        <p:cNvPr id="1" name=""/>
+        <p:cNvGrpSpPr/>
+        <p:nvPr/>
+      </p:nvGrpSpPr>
+      <p:grpSpPr>
+        <a:xfrm>
+          <a:off x="0" y="0"/>
+          <a:ext cx="0" cy="0"/>
+          <a:chOff x="0" y="0"/>
+          <a:chExt cx="0" cy="0"/>
+        </a:xfrm>
+      </p:grpSpPr>
+      <p:sp>
+        <p:nvSpPr>
+          <p:cNvPr id="2" name="Title 1"/>
+          <p:cNvSpPr>
+            <a:spLocks noGrp="1"/>
+          </p:cNvSpPr>
+          <p:nvPr>
+            <p:ph type="title"/>
+          </p:nvPr>
+        </p:nvSpPr>
+        <p:spPr/>
+        <p:txBody>
+          <a:bodyPr/>
+          <a:lstStyle/>
+          <a:p>
+            <a:r>
+              <a:rPr lang="en-US" sz="3200" dirty="0"/>
+              <a:t>What it isn’t</a:t>
+            </a:r>
+          </a:p>
+        </p:txBody>
+      </p:sp>
+      <p:sp>
+        <p:nvSpPr>
+          <p:cNvPr id="3" name="Content Placeholder 2"/>
+          <p:cNvSpPr>
+            <a:spLocks noGrp="1"/>
+          </p:cNvSpPr>
+          <p:nvPr>
+            <p:ph idx="1"/>
+          </p:nvPr>
+        </p:nvSpPr>
+        <p:spPr/>
+        <p:txBody>
+          <a:bodyPr/>
+          <a:lstStyle/>
+          <a:p>
+            <a:r>
+              <a:rPr lang="en-US" dirty="0"/>
+              <a:t>Difference to a Relation DB</a:t>
+            </a:r>
+          </a:p>
+          <a:p>
+            <a:pPr lvl="1"/>
+            <a:r>
+              <a:rPr lang="en-US" dirty="0"/>
+              <a:t>No table joins, query on a single “table”</a:t>
             </a:r>
           </a:p>
           <a:p>
             <a:r>
               <a:rPr lang="en-US" dirty="0"/>
               <a:t>No atomic transactions</a:t>
+            </a:r>
+          </a:p>
+          <a:p>
+            <a:r>
+              <a:rPr lang="en-US" dirty="0"/>
+              <a:t>No data schema</a:t>
             </a:r>
           </a:p>
         </p:txBody>
@@ -4267,33 +4372,15 @@
                                   </p:childTnLst>
                                 </p:cTn>
                               </p:par>
-                            </p:childTnLst>
-                          </p:cTn>
-                        </p:par>
-                      </p:childTnLst>
-                    </p:cTn>
-                  </p:par>
-                  <p:par>
-                    <p:cTn id="7" fill="hold">
-                      <p:stCondLst>
-                        <p:cond delay="indefinite"/>
-                      </p:stCondLst>
-                      <p:childTnLst>
-                        <p:par>
-                          <p:cTn id="8" fill="hold">
-                            <p:stCondLst>
-                              <p:cond delay="0"/>
-                            </p:stCondLst>
-                            <p:childTnLst>
                               <p:par>
-                                <p:cTn id="9" presetID="1" presetClass="entr" presetSubtype="0" fill="hold" grpId="0" nodeType="clickEffect">
+                                <p:cTn id="7" presetID="1" presetClass="entr" presetSubtype="0" fill="hold" grpId="0" nodeType="withEffect">
                                   <p:stCondLst>
                                     <p:cond delay="0"/>
                                   </p:stCondLst>
                                   <p:childTnLst>
                                     <p:set>
                                       <p:cBhvr>
-                                        <p:cTn id="10" dur="1" fill="hold">
+                                        <p:cTn id="8" dur="1" fill="hold">
                                           <p:stCondLst>
                                             <p:cond delay="0"/>
                                           </p:stCondLst>
@@ -4302,6 +4389,104 @@
                                           <p:spTgt spid="3">
                                             <p:txEl>
                                               <p:pRg st="1" end="1"/>
+                                            </p:txEl>
+                                          </p:spTgt>
+                                        </p:tgtEl>
+                                        <p:attrNameLst>
+                                          <p:attrName>style.visibility</p:attrName>
+                                        </p:attrNameLst>
+                                      </p:cBhvr>
+                                      <p:to>
+                                        <p:strVal val="visible"/>
+                                      </p:to>
+                                    </p:set>
+                                  </p:childTnLst>
+                                </p:cTn>
+                              </p:par>
+                            </p:childTnLst>
+                          </p:cTn>
+                        </p:par>
+                      </p:childTnLst>
+                    </p:cTn>
+                  </p:par>
+                  <p:par>
+                    <p:cTn id="9" fill="hold">
+                      <p:stCondLst>
+                        <p:cond delay="indefinite"/>
+                      </p:stCondLst>
+                      <p:childTnLst>
+                        <p:par>
+                          <p:cTn id="10" fill="hold">
+                            <p:stCondLst>
+                              <p:cond delay="0"/>
+                            </p:stCondLst>
+                            <p:childTnLst>
+                              <p:par>
+                                <p:cTn id="11" presetID="1" presetClass="entr" presetSubtype="0" fill="hold" grpId="0" nodeType="clickEffect">
+                                  <p:stCondLst>
+                                    <p:cond delay="0"/>
+                                  </p:stCondLst>
+                                  <p:childTnLst>
+                                    <p:set>
+                                      <p:cBhvr>
+                                        <p:cTn id="12" dur="1" fill="hold">
+                                          <p:stCondLst>
+                                            <p:cond delay="0"/>
+                                          </p:stCondLst>
+                                        </p:cTn>
+                                        <p:tgtEl>
+                                          <p:spTgt spid="3">
+                                            <p:txEl>
+                                              <p:pRg st="2" end="2"/>
+                                            </p:txEl>
+                                          </p:spTgt>
+                                        </p:tgtEl>
+                                        <p:attrNameLst>
+                                          <p:attrName>style.visibility</p:attrName>
+                                        </p:attrNameLst>
+                                      </p:cBhvr>
+                                      <p:to>
+                                        <p:strVal val="visible"/>
+                                      </p:to>
+                                    </p:set>
+                                  </p:childTnLst>
+                                </p:cTn>
+                              </p:par>
+                            </p:childTnLst>
+                          </p:cTn>
+                        </p:par>
+                      </p:childTnLst>
+                    </p:cTn>
+                  </p:par>
+                  <p:par>
+                    <p:cTn id="13" fill="hold">
+                      <p:stCondLst>
+                        <p:cond delay="indefinite"/>
+                      </p:stCondLst>
+                      <p:childTnLst>
+                        <p:par>
+                          <p:cTn id="14" fill="hold">
+                            <p:stCondLst>
+                              <p:cond delay="0"/>
+                            </p:stCondLst>
+                            <p:childTnLst>
+                              <p:par>
+                                <p:cTn id="15" presetID="1" presetClass="entr" presetSubtype="0" fill="hold" grpId="0" nodeType="clickEffect">
+                                  <p:stCondLst>
+                                    <p:cond delay="0"/>
+                                  </p:stCondLst>
+                                  <p:childTnLst>
+                                    <p:set>
+                                      <p:cBhvr>
+                                        <p:cTn id="16" dur="1" fill="hold">
+                                          <p:stCondLst>
+                                            <p:cond delay="0"/>
+                                          </p:stCondLst>
+                                        </p:cTn>
+                                        <p:tgtEl>
+                                          <p:spTgt spid="3">
+                                            <p:txEl>
+                                              <p:pRg st="3" end="3"/>
                                             </p:txEl>
                                           </p:spTgt>
                                         </p:tgtEl>
@@ -4350,7 +4535,7 @@
 </p:sld>
 </file>
 
-<file path=ppt/slides/slide16.xml><?xml version="1.0" encoding="utf-8"?>
+<file path=ppt/slides/slide17.xml><?xml version="1.0" encoding="utf-8"?>
 <p:sld xmlns:a="http://schemas.openxmlformats.org/drawingml/2006/main" xmlns:r="http://schemas.openxmlformats.org/officeDocument/2006/relationships" xmlns:p="http://schemas.openxmlformats.org/presentationml/2006/main">
   <p:cSld>
     <p:spTree>
@@ -4552,7 +4737,7 @@
 </p:sld>
 </file>
 
-<file path=ppt/slides/slide17.xml><?xml version="1.0" encoding="utf-8"?>
+<file path=ppt/slides/slide18.xml><?xml version="1.0" encoding="utf-8"?>
 <p:sld xmlns:a="http://schemas.openxmlformats.org/drawingml/2006/main" xmlns:r="http://schemas.openxmlformats.org/officeDocument/2006/relationships" xmlns:p="http://schemas.openxmlformats.org/presentationml/2006/main">
   <p:cSld>
     <p:spTree>
@@ -4847,127 +5032,6 @@
 </p:sld>
 </file>
 
-<file path=ppt/slides/slide18.xml><?xml version="1.0" encoding="utf-8"?>
-<p:sld xmlns:a="http://schemas.openxmlformats.org/drawingml/2006/main" xmlns:r="http://schemas.openxmlformats.org/officeDocument/2006/relationships" xmlns:p="http://schemas.openxmlformats.org/presentationml/2006/main">
-  <p:cSld>
-    <p:spTree>
-      <p:nvGrpSpPr>
-        <p:cNvPr id="1" name=""/>
-        <p:cNvGrpSpPr/>
-        <p:nvPr/>
-      </p:nvGrpSpPr>
-      <p:grpSpPr>
-        <a:xfrm>
-          <a:off x="0" y="0"/>
-          <a:ext cx="0" cy="0"/>
-          <a:chOff x="0" y="0"/>
-          <a:chExt cx="0" cy="0"/>
-        </a:xfrm>
-      </p:grpSpPr>
-      <p:sp>
-        <p:nvSpPr>
-          <p:cNvPr id="2" name="Title 1"/>
-          <p:cNvSpPr>
-            <a:spLocks noGrp="1"/>
-          </p:cNvSpPr>
-          <p:nvPr>
-            <p:ph type="title"/>
-          </p:nvPr>
-        </p:nvSpPr>
-        <p:spPr/>
-        <p:txBody>
-          <a:bodyPr/>
-          <a:lstStyle/>
-          <a:p>
-            <a:r>
-              <a:rPr lang="en-US" sz="3200" dirty="0"/>
-              <a:t>Inverted Indexes</a:t>
-            </a:r>
-          </a:p>
-        </p:txBody>
-      </p:sp>
-      <p:sp>
-        <p:nvSpPr>
-          <p:cNvPr id="3" name="Content Placeholder 2"/>
-          <p:cNvSpPr>
-            <a:spLocks noGrp="1"/>
-          </p:cNvSpPr>
-          <p:nvPr>
-            <p:ph idx="1"/>
-          </p:nvPr>
-        </p:nvSpPr>
-        <p:spPr>
-          <a:xfrm>
-            <a:off x="457200" y="742950"/>
-            <a:ext cx="8229600" cy="3851673"/>
-          </a:xfrm>
-        </p:spPr>
-        <p:txBody>
-          <a:bodyPr/>
-          <a:lstStyle/>
-          <a:p>
-            <a:pPr marL="0" indent="0">
-              <a:buNone/>
-            </a:pPr>
-            <a:r>
-              <a:rPr lang="en-US" b="1" dirty="0"/>
-              <a:t>Documents:</a:t>
-            </a:r>
-          </a:p>
-          <a:p>
-            <a:pPr marL="0" indent="0">
-              <a:buNone/>
-            </a:pPr>
-            <a:r>
-              <a:rPr lang="en-US" sz="2400" dirty="0"/>
-              <a:t>{"_id": 1, "title": "Large kitchen, stylish bathrooms", …}</a:t>
-            </a:r>
-          </a:p>
-          <a:p>
-            <a:pPr marL="0" indent="0">
-              <a:buNone/>
-            </a:pPr>
-            <a:r>
-              <a:rPr lang="en-US" sz="2400" dirty="0"/>
-              <a:t>{"_id": 2, "title": "Stylish features and lovely garden", …}</a:t>
-            </a:r>
-          </a:p>
-          <a:p>
-            <a:pPr marL="0" indent="0">
-              <a:buNone/>
-            </a:pPr>
-            <a:r>
-              <a:rPr lang="en-US" sz="2400" dirty="0"/>
-              <a:t>{"_id": 3, "title": "Large stylish kitchen", …}</a:t>
-            </a:r>
-          </a:p>
-          <a:p>
-            <a:pPr marL="0" indent="0">
-              <a:buNone/>
-            </a:pPr>
-            <a:endParaRPr lang="en-US" sz="2400" dirty="0"/>
-          </a:p>
-          <a:p>
-            <a:pPr marL="0" indent="0">
-              <a:buNone/>
-            </a:pPr>
-            <a:endParaRPr lang="en-US" sz="2400" dirty="0"/>
-          </a:p>
-        </p:txBody>
-      </p:sp>
-    </p:spTree>
-    <p:extLst>
-      <p:ext uri="{BB962C8B-B14F-4D97-AF65-F5344CB8AC3E}">
-        <p14:creationId xmlns:p14="http://schemas.microsoft.com/office/powerpoint/2010/main" val="730547165"/>
-      </p:ext>
-    </p:extLst>
-  </p:cSld>
-  <p:clrMapOvr>
-    <a:masterClrMapping/>
-  </p:clrMapOvr>
-</p:sld>
-</file>
-
 <file path=ppt/slides/slide19.xml><?xml version="1.0" encoding="utf-8"?>
 <p:sld xmlns:a="http://schemas.openxmlformats.org/drawingml/2006/main" xmlns:r="http://schemas.openxmlformats.org/officeDocument/2006/relationships" xmlns:p="http://schemas.openxmlformats.org/presentationml/2006/main">
   <p:cSld>
@@ -5066,10 +5130,6 @@
             <a:pPr marL="0" indent="0">
               <a:buNone/>
             </a:pPr>
-            <a:r>
-              <a:rPr lang="en-US" b="1" dirty="0"/>
-              <a:t>Inverted Index for “title”:</a:t>
-            </a:r>
             <a:endParaRPr lang="en-US" sz="2400" dirty="0"/>
           </a:p>
           <a:p>
@@ -5080,153 +5140,10 @@
           </a:p>
         </p:txBody>
       </p:sp>
-      <p:graphicFrame>
-        <p:nvGraphicFramePr>
-          <p:cNvPr id="4" name="Table 3"/>
-          <p:cNvGraphicFramePr>
-            <a:graphicFrameLocks noGrp="1"/>
-          </p:cNvGraphicFramePr>
-          <p:nvPr>
-            <p:extLst>
-              <p:ext uri="{D42A27DB-BD31-4B8C-83A1-F6EECF244321}">
-                <p14:modId xmlns:p14="http://schemas.microsoft.com/office/powerpoint/2010/main" val="2358767264"/>
-              </p:ext>
-            </p:extLst>
-          </p:nvPr>
-        </p:nvGraphicFramePr>
-        <p:xfrm>
-          <a:off x="914400" y="3333750"/>
-          <a:ext cx="7162800" cy="1402080"/>
-        </p:xfrm>
-        <a:graphic>
-          <a:graphicData uri="http://schemas.openxmlformats.org/drawingml/2006/table">
-            <a:tbl>
-              <a:tblPr bandRow="1">
-                <a:tableStyleId>{5C22544A-7EE6-4342-B048-85BDC9FD1C3A}</a:tableStyleId>
-              </a:tblPr>
-              <a:tblGrid>
-                <a:gridCol w="1066800">
-                  <a:extLst>
-                    <a:ext uri="{9D8B030D-6E8A-4147-A177-3AD203B41FA5}">
-                      <a16:colId xmlns:a16="http://schemas.microsoft.com/office/drawing/2014/main" val="20000"/>
-                    </a:ext>
-                  </a:extLst>
-                </a:gridCol>
-                <a:gridCol w="6096000">
-                  <a:extLst>
-                    <a:ext uri="{9D8B030D-6E8A-4147-A177-3AD203B41FA5}">
-                      <a16:colId xmlns:a16="http://schemas.microsoft.com/office/drawing/2014/main" val="20001"/>
-                    </a:ext>
-                  </a:extLst>
-                </a:gridCol>
-              </a:tblGrid>
-              <a:tr h="467360">
-                <a:tc>
-                  <a:txBody>
-                    <a:bodyPr/>
-                    <a:lstStyle/>
-                    <a:p>
-                      <a:r>
-                        <a:rPr lang="en-US" dirty="0"/>
-                        <a:t>large</a:t>
-                      </a:r>
-                    </a:p>
-                  </a:txBody>
-                  <a:tcPr/>
-                </a:tc>
-                <a:tc>
-                  <a:txBody>
-                    <a:bodyPr/>
-                    <a:lstStyle/>
-                    <a:p>
-                      <a:r>
-                        <a:rPr lang="en-US" dirty="0"/>
-                        <a:t>1, 3</a:t>
-                      </a:r>
-                    </a:p>
-                  </a:txBody>
-                  <a:tcPr/>
-                </a:tc>
-                <a:extLst>
-                  <a:ext uri="{0D108BD9-81ED-4DB2-BD59-A6C34878D82A}">
-                    <a16:rowId xmlns:a16="http://schemas.microsoft.com/office/drawing/2014/main" val="10000"/>
-                  </a:ext>
-                </a:extLst>
-              </a:tr>
-              <a:tr h="467360">
-                <a:tc>
-                  <a:txBody>
-                    <a:bodyPr/>
-                    <a:lstStyle/>
-                    <a:p>
-                      <a:r>
-                        <a:rPr lang="en-US" dirty="0"/>
-                        <a:t>kitchen</a:t>
-                      </a:r>
-                    </a:p>
-                  </a:txBody>
-                  <a:tcPr/>
-                </a:tc>
-                <a:tc>
-                  <a:txBody>
-                    <a:bodyPr/>
-                    <a:lstStyle/>
-                    <a:p>
-                      <a:r>
-                        <a:rPr lang="en-US" dirty="0"/>
-                        <a:t>1, 3</a:t>
-                      </a:r>
-                    </a:p>
-                  </a:txBody>
-                  <a:tcPr/>
-                </a:tc>
-                <a:extLst>
-                  <a:ext uri="{0D108BD9-81ED-4DB2-BD59-A6C34878D82A}">
-                    <a16:rowId xmlns:a16="http://schemas.microsoft.com/office/drawing/2014/main" val="10001"/>
-                  </a:ext>
-                </a:extLst>
-              </a:tr>
-              <a:tr h="467360">
-                <a:tc>
-                  <a:txBody>
-                    <a:bodyPr/>
-                    <a:lstStyle/>
-                    <a:p>
-                      <a:r>
-                        <a:rPr lang="en-US" dirty="0"/>
-                        <a:t>stylish</a:t>
-                      </a:r>
-                    </a:p>
-                  </a:txBody>
-                  <a:tcPr/>
-                </a:tc>
-                <a:tc>
-                  <a:txBody>
-                    <a:bodyPr/>
-                    <a:lstStyle/>
-                    <a:p>
-                      <a:r>
-                        <a:rPr lang="en-US" dirty="0"/>
-                        <a:t>1, 2, 3</a:t>
-                      </a:r>
-                    </a:p>
-                  </a:txBody>
-                  <a:tcPr/>
-                </a:tc>
-                <a:extLst>
-                  <a:ext uri="{0D108BD9-81ED-4DB2-BD59-A6C34878D82A}">
-                    <a16:rowId xmlns:a16="http://schemas.microsoft.com/office/drawing/2014/main" val="10002"/>
-                  </a:ext>
-                </a:extLst>
-              </a:tr>
-            </a:tbl>
-          </a:graphicData>
-        </a:graphic>
-      </p:graphicFrame>
     </p:spTree>
     <p:extLst>
       <p:ext uri="{BB962C8B-B14F-4D97-AF65-F5344CB8AC3E}">
-        <p14:creationId xmlns:p14="http://schemas.microsoft.com/office/powerpoint/2010/main" val="3636465841"/>
+        <p14:creationId xmlns:p14="http://schemas.microsoft.com/office/powerpoint/2010/main" val="730547165"/>
       </p:ext>
     </p:extLst>
   </p:cSld>
@@ -5663,7 +5580,7 @@
           <a:p>
             <a:r>
               <a:rPr lang="en-US" sz="3200" dirty="0"/>
-              <a:t>Index Mappings</a:t>
+              <a:t>Inverted Indexes</a:t>
             </a:r>
           </a:p>
         </p:txBody>
@@ -5680,37 +5597,38 @@
         </p:nvSpPr>
         <p:spPr>
           <a:xfrm>
-            <a:off x="381000" y="971550"/>
-            <a:ext cx="8229600" cy="3505199"/>
+            <a:off x="457200" y="742950"/>
+            <a:ext cx="8229600" cy="3851673"/>
           </a:xfrm>
         </p:spPr>
         <p:txBody>
-          <a:bodyPr>
-            <a:normAutofit fontScale="70000" lnSpcReduction="20000"/>
-          </a:bodyPr>
+          <a:bodyPr/>
           <a:lstStyle/>
           <a:p>
             <a:pPr marL="0" indent="0">
               <a:buNone/>
             </a:pPr>
             <a:r>
-              <a:rPr lang="en-US" dirty="0"/>
-              <a:t>A bit like a Database schema:</a:t>
+              <a:rPr lang="en-US" b="1" dirty="0"/>
+              <a:t>Documents:</a:t>
             </a:r>
           </a:p>
           <a:p>
             <a:pPr marL="0" indent="0">
               <a:buNone/>
             </a:pPr>
-            <a:endParaRPr lang="hu-HU" dirty="0"/>
+            <a:r>
+              <a:rPr lang="en-US" sz="2400" dirty="0"/>
+              <a:t>{"_id": 1, "title": "Large kitchen, stylish bathrooms", …}</a:t>
+            </a:r>
           </a:p>
           <a:p>
             <a:pPr marL="0" indent="0">
               <a:buNone/>
             </a:pPr>
             <a:r>
-              <a:rPr lang="hu-HU" dirty="0"/>
-              <a:t>{</a:t>
+              <a:rPr lang="en-US" sz="2400" dirty="0"/>
+              <a:t>{"_id": 2, "title": "Stylish features and lovely garden", …}</a:t>
             </a:r>
           </a:p>
           <a:p>
@@ -5718,8 +5636,8 @@
               <a:buNone/>
             </a:pPr>
             <a:r>
-              <a:rPr lang="hu-HU" dirty="0"/>
-              <a:t>    "listing": {</a:t>
+              <a:rPr lang="en-US" sz="2400" dirty="0"/>
+              <a:t>{"_id": 3, "title": "Large stylish kitchen", …}</a:t>
             </a:r>
           </a:p>
           <a:p>
@@ -5727,107 +5645,166 @@
               <a:buNone/>
             </a:pPr>
             <a:r>
-              <a:rPr lang="hu-HU" dirty="0"/>
-              <a:t>        "</a:t>
-            </a:r>
-            <a:r>
-              <a:rPr lang="hu-HU" b="1" dirty="0"/>
-              <a:t>properties</a:t>
-            </a:r>
-            <a:r>
-              <a:rPr lang="hu-HU" dirty="0"/>
-              <a:t>": {</a:t>
-            </a:r>
+              <a:rPr lang="en-US" b="1" dirty="0"/>
+              <a:t>Inverted Index for “title”:</a:t>
+            </a:r>
+            <a:endParaRPr lang="en-US" sz="2400" dirty="0"/>
           </a:p>
           <a:p>
             <a:pPr marL="0" indent="0">
               <a:buNone/>
             </a:pPr>
-            <a:r>
-              <a:rPr lang="hu-HU" dirty="0"/>
-              <a:t>             "title": {"</a:t>
-            </a:r>
-            <a:r>
-              <a:rPr lang="hu-HU" b="1" dirty="0"/>
-              <a:t>type</a:t>
-            </a:r>
-            <a:r>
-              <a:rPr lang="hu-HU" dirty="0"/>
-              <a:t>": "</a:t>
-            </a:r>
-            <a:r>
-              <a:rPr lang="hu-HU" b="1" dirty="0"/>
-              <a:t>text</a:t>
-            </a:r>
-            <a:r>
-              <a:rPr lang="hu-HU" dirty="0"/>
-              <a:t>"},</a:t>
-            </a:r>
-          </a:p>
-          <a:p>
-            <a:pPr marL="0" indent="0">
-              <a:buNone/>
-            </a:pPr>
-            <a:r>
-              <a:rPr lang="hu-HU" dirty="0"/>
-              <a:t>             "description": {"</a:t>
-            </a:r>
-            <a:r>
-              <a:rPr lang="hu-HU" b="1" dirty="0"/>
-              <a:t>type</a:t>
-            </a:r>
-            <a:r>
-              <a:rPr lang="hu-HU" dirty="0"/>
-              <a:t>": "</a:t>
-            </a:r>
-            <a:r>
-              <a:rPr lang="hu-HU" b="1" dirty="0"/>
-              <a:t>text</a:t>
-            </a:r>
-            <a:r>
-              <a:rPr lang="hu-HU" dirty="0"/>
-              <a:t>"}</a:t>
-            </a:r>
-          </a:p>
-          <a:p>
-            <a:pPr marL="0" indent="0">
-              <a:buNone/>
-            </a:pPr>
-            <a:r>
-              <a:rPr lang="hu-HU" dirty="0"/>
-              <a:t>        }</a:t>
-            </a:r>
-          </a:p>
-          <a:p>
-            <a:pPr marL="0" indent="0">
-              <a:buNone/>
-            </a:pPr>
-            <a:r>
-              <a:rPr lang="hu-HU" dirty="0"/>
-              <a:t>    }</a:t>
-            </a:r>
-          </a:p>
-          <a:p>
-            <a:pPr marL="0" indent="0">
-              <a:buNone/>
-            </a:pPr>
-            <a:r>
-              <a:rPr lang="hu-HU" dirty="0"/>
-              <a:t>}</a:t>
-            </a:r>
-          </a:p>
-          <a:p>
-            <a:pPr marL="0" indent="0">
-              <a:buNone/>
-            </a:pPr>
-            <a:endParaRPr lang="en-US" dirty="0"/>
-          </a:p>
-        </p:txBody>
-      </p:sp>
+            <a:endParaRPr lang="en-US" sz="2400" dirty="0"/>
+          </a:p>
+        </p:txBody>
+      </p:sp>
+      <p:graphicFrame>
+        <p:nvGraphicFramePr>
+          <p:cNvPr id="4" name="Table 3"/>
+          <p:cNvGraphicFramePr>
+            <a:graphicFrameLocks noGrp="1"/>
+          </p:cNvGraphicFramePr>
+          <p:nvPr>
+            <p:extLst>
+              <p:ext uri="{D42A27DB-BD31-4B8C-83A1-F6EECF244321}">
+                <p14:modId xmlns:p14="http://schemas.microsoft.com/office/powerpoint/2010/main" val="2358767264"/>
+              </p:ext>
+            </p:extLst>
+          </p:nvPr>
+        </p:nvGraphicFramePr>
+        <p:xfrm>
+          <a:off x="914400" y="3333750"/>
+          <a:ext cx="7162800" cy="1402080"/>
+        </p:xfrm>
+        <a:graphic>
+          <a:graphicData uri="http://schemas.openxmlformats.org/drawingml/2006/table">
+            <a:tbl>
+              <a:tblPr bandRow="1">
+                <a:tableStyleId>{5C22544A-7EE6-4342-B048-85BDC9FD1C3A}</a:tableStyleId>
+              </a:tblPr>
+              <a:tblGrid>
+                <a:gridCol w="1066800">
+                  <a:extLst>
+                    <a:ext uri="{9D8B030D-6E8A-4147-A177-3AD203B41FA5}">
+                      <a16:colId xmlns:a16="http://schemas.microsoft.com/office/drawing/2014/main" val="20000"/>
+                    </a:ext>
+                  </a:extLst>
+                </a:gridCol>
+                <a:gridCol w="6096000">
+                  <a:extLst>
+                    <a:ext uri="{9D8B030D-6E8A-4147-A177-3AD203B41FA5}">
+                      <a16:colId xmlns:a16="http://schemas.microsoft.com/office/drawing/2014/main" val="20001"/>
+                    </a:ext>
+                  </a:extLst>
+                </a:gridCol>
+              </a:tblGrid>
+              <a:tr h="467360">
+                <a:tc>
+                  <a:txBody>
+                    <a:bodyPr/>
+                    <a:lstStyle/>
+                    <a:p>
+                      <a:r>
+                        <a:rPr lang="en-US" dirty="0"/>
+                        <a:t>large</a:t>
+                      </a:r>
+                    </a:p>
+                  </a:txBody>
+                  <a:tcPr/>
+                </a:tc>
+                <a:tc>
+                  <a:txBody>
+                    <a:bodyPr/>
+                    <a:lstStyle/>
+                    <a:p>
+                      <a:r>
+                        <a:rPr lang="en-US" dirty="0"/>
+                        <a:t>1, 3</a:t>
+                      </a:r>
+                    </a:p>
+                  </a:txBody>
+                  <a:tcPr/>
+                </a:tc>
+                <a:extLst>
+                  <a:ext uri="{0D108BD9-81ED-4DB2-BD59-A6C34878D82A}">
+                    <a16:rowId xmlns:a16="http://schemas.microsoft.com/office/drawing/2014/main" val="10000"/>
+                  </a:ext>
+                </a:extLst>
+              </a:tr>
+              <a:tr h="467360">
+                <a:tc>
+                  <a:txBody>
+                    <a:bodyPr/>
+                    <a:lstStyle/>
+                    <a:p>
+                      <a:r>
+                        <a:rPr lang="en-US" dirty="0"/>
+                        <a:t>kitchen</a:t>
+                      </a:r>
+                    </a:p>
+                  </a:txBody>
+                  <a:tcPr/>
+                </a:tc>
+                <a:tc>
+                  <a:txBody>
+                    <a:bodyPr/>
+                    <a:lstStyle/>
+                    <a:p>
+                      <a:r>
+                        <a:rPr lang="en-US" dirty="0"/>
+                        <a:t>1, 3</a:t>
+                      </a:r>
+                    </a:p>
+                  </a:txBody>
+                  <a:tcPr/>
+                </a:tc>
+                <a:extLst>
+                  <a:ext uri="{0D108BD9-81ED-4DB2-BD59-A6C34878D82A}">
+                    <a16:rowId xmlns:a16="http://schemas.microsoft.com/office/drawing/2014/main" val="10001"/>
+                  </a:ext>
+                </a:extLst>
+              </a:tr>
+              <a:tr h="467360">
+                <a:tc>
+                  <a:txBody>
+                    <a:bodyPr/>
+                    <a:lstStyle/>
+                    <a:p>
+                      <a:r>
+                        <a:rPr lang="en-US" dirty="0"/>
+                        <a:t>stylish</a:t>
+                      </a:r>
+                    </a:p>
+                  </a:txBody>
+                  <a:tcPr/>
+                </a:tc>
+                <a:tc>
+                  <a:txBody>
+                    <a:bodyPr/>
+                    <a:lstStyle/>
+                    <a:p>
+                      <a:r>
+                        <a:rPr lang="en-US" dirty="0"/>
+                        <a:t>1, 2, 3</a:t>
+                      </a:r>
+                    </a:p>
+                  </a:txBody>
+                  <a:tcPr/>
+                </a:tc>
+                <a:extLst>
+                  <a:ext uri="{0D108BD9-81ED-4DB2-BD59-A6C34878D82A}">
+                    <a16:rowId xmlns:a16="http://schemas.microsoft.com/office/drawing/2014/main" val="10002"/>
+                  </a:ext>
+                </a:extLst>
+              </a:tr>
+            </a:tbl>
+          </a:graphicData>
+        </a:graphic>
+      </p:graphicFrame>
     </p:spTree>
     <p:extLst>
       <p:ext uri="{BB962C8B-B14F-4D97-AF65-F5344CB8AC3E}">
-        <p14:creationId xmlns:p14="http://schemas.microsoft.com/office/powerpoint/2010/main" val="1628833876"/>
+        <p14:creationId xmlns:p14="http://schemas.microsoft.com/office/powerpoint/2010/main" val="3636465841"/>
       </p:ext>
     </p:extLst>
   </p:cSld>
@@ -5871,7 +5848,7 @@
           <a:p>
             <a:r>
               <a:rPr lang="en-US" sz="3200" dirty="0"/>
-              <a:t>Searches</a:t>
+              <a:t>Index Mappings</a:t>
             </a:r>
           </a:p>
         </p:txBody>
@@ -5886,10 +5863,15 @@
             <p:ph idx="1"/>
           </p:nvPr>
         </p:nvSpPr>
-        <p:spPr/>
+        <p:spPr>
+          <a:xfrm>
+            <a:off x="381000" y="971550"/>
+            <a:ext cx="8229600" cy="3505199"/>
+          </a:xfrm>
+        </p:spPr>
         <p:txBody>
           <a:bodyPr>
-            <a:normAutofit fontScale="70000" lnSpcReduction="20000"/>
+            <a:normAutofit fontScale="62500" lnSpcReduction="20000"/>
           </a:bodyPr>
           <a:lstStyle/>
           <a:p>
@@ -5898,41 +5880,22 @@
             </a:pPr>
             <a:r>
               <a:rPr lang="en-US" dirty="0"/>
-              <a:t>{</a:t>
+              <a:t>A bit like a Database schema, but describes how to index each field:</a:t>
             </a:r>
           </a:p>
           <a:p>
             <a:pPr marL="0" indent="0">
               <a:buNone/>
             </a:pPr>
-            <a:r>
-              <a:rPr lang="en-US" dirty="0"/>
-              <a:t>    "</a:t>
-            </a:r>
-            <a:r>
-              <a:rPr lang="en-US" b="1" dirty="0"/>
-              <a:t>query</a:t>
-            </a:r>
-            <a:r>
-              <a:rPr lang="en-US" dirty="0"/>
-              <a:t>": {</a:t>
-            </a:r>
+            <a:endParaRPr lang="hu-HU" dirty="0"/>
           </a:p>
           <a:p>
             <a:pPr marL="0" indent="0">
               <a:buNone/>
             </a:pPr>
             <a:r>
-              <a:rPr lang="en-US" dirty="0"/>
-              <a:t>        "</a:t>
-            </a:r>
-            <a:r>
-              <a:rPr lang="en-US" b="1" dirty="0"/>
-              <a:t>match</a:t>
-            </a:r>
-            <a:r>
-              <a:rPr lang="en-US" dirty="0"/>
-              <a:t>": {</a:t>
+              <a:rPr lang="hu-HU" dirty="0"/>
+              <a:t>{</a:t>
             </a:r>
           </a:p>
           <a:p>
@@ -5940,8 +5903,8 @@
               <a:buNone/>
             </a:pPr>
             <a:r>
-              <a:rPr lang="en-US" dirty="0"/>
-              <a:t>           "title": {</a:t>
+              <a:rPr lang="hu-HU" dirty="0"/>
+              <a:t>    "listing": {</a:t>
             </a:r>
           </a:p>
           <a:p>
@@ -5949,36 +5912,16 @@
               <a:buNone/>
             </a:pPr>
             <a:r>
-              <a:rPr lang="en-US" dirty="0"/>
-              <a:t>                "</a:t>
-            </a:r>
-            <a:r>
-              <a:rPr lang="en-US" b="1" dirty="0"/>
-              <a:t>query</a:t>
-            </a:r>
-            <a:r>
-              <a:rPr lang="en-US" dirty="0"/>
-              <a:t>": "</a:t>
-            </a:r>
-            <a:r>
-              <a:rPr lang="en-US" dirty="0">
-                <a:solidFill>
-                  <a:schemeClr val="tx1"/>
-                </a:solidFill>
-              </a:rPr>
-              <a:t>Gas </a:t>
-            </a:r>
-            <a:r>
-              <a:rPr lang="en-US" dirty="0" err="1">
-                <a:solidFill>
-                  <a:schemeClr val="tx1"/>
-                </a:solidFill>
-              </a:rPr>
-              <a:t>Coiking</a:t>
-            </a:r>
-            <a:r>
-              <a:rPr lang="en-US" dirty="0"/>
-              <a:t>",</a:t>
+              <a:rPr lang="hu-HU" dirty="0"/>
+              <a:t>        "</a:t>
+            </a:r>
+            <a:r>
+              <a:rPr lang="hu-HU" b="1" dirty="0"/>
+              <a:t>properties</a:t>
+            </a:r>
+            <a:r>
+              <a:rPr lang="hu-HU" dirty="0"/>
+              <a:t>": {</a:t>
             </a:r>
           </a:p>
           <a:p>
@@ -5986,28 +5929,24 @@
               <a:buNone/>
             </a:pPr>
             <a:r>
-              <a:rPr lang="en-US" dirty="0"/>
-              <a:t>              </a:t>
-            </a:r>
-            <a:r>
-              <a:rPr lang="en-US"/>
-              <a:t>  "</a:t>
-            </a:r>
-            <a:r>
-              <a:rPr lang="en-US" b="1" dirty="0"/>
-              <a:t>fuzziness</a:t>
-            </a:r>
-            <a:r>
-              <a:rPr lang="en-US" dirty="0"/>
+              <a:rPr lang="hu-HU" dirty="0"/>
+              <a:t>             "title": {"</a:t>
+            </a:r>
+            <a:r>
+              <a:rPr lang="hu-HU" b="1" dirty="0"/>
+              <a:t>type</a:t>
+            </a:r>
+            <a:r>
+              <a:rPr lang="hu-HU" dirty="0"/>
               <a:t>": "</a:t>
             </a:r>
             <a:r>
-              <a:rPr lang="en-US" b="1" dirty="0"/>
-              <a:t>AUTO</a:t>
-            </a:r>
-            <a:r>
-              <a:rPr lang="en-US" dirty="0"/>
-              <a:t>"</a:t>
+              <a:rPr lang="hu-HU" b="1" dirty="0"/>
+              <a:t>text</a:t>
+            </a:r>
+            <a:r>
+              <a:rPr lang="hu-HU" dirty="0"/>
+              <a:t>"},</a:t>
             </a:r>
           </a:p>
           <a:p>
@@ -6015,8 +5954,24 @@
               <a:buNone/>
             </a:pPr>
             <a:r>
-              <a:rPr lang="en-US" dirty="0"/>
-              <a:t>           }</a:t>
+              <a:rPr lang="hu-HU" dirty="0"/>
+              <a:t>             "description": {"</a:t>
+            </a:r>
+            <a:r>
+              <a:rPr lang="hu-HU" b="1" dirty="0"/>
+              <a:t>type</a:t>
+            </a:r>
+            <a:r>
+              <a:rPr lang="hu-HU" dirty="0"/>
+              <a:t>": "</a:t>
+            </a:r>
+            <a:r>
+              <a:rPr lang="hu-HU" b="1" dirty="0"/>
+              <a:t>text</a:t>
+            </a:r>
+            <a:r>
+              <a:rPr lang="hu-HU" dirty="0"/>
+              <a:t>"}</a:t>
             </a:r>
           </a:p>
           <a:p>
@@ -6024,7 +5979,7 @@
               <a:buNone/>
             </a:pPr>
             <a:r>
-              <a:rPr lang="en-US" dirty="0"/>
+              <a:rPr lang="hu-HU" dirty="0"/>
               <a:t>        }</a:t>
             </a:r>
           </a:p>
@@ -6033,7 +5988,7 @@
               <a:buNone/>
             </a:pPr>
             <a:r>
-              <a:rPr lang="en-US" dirty="0"/>
+              <a:rPr lang="hu-HU" dirty="0"/>
               <a:t>    }</a:t>
             </a:r>
           </a:p>
@@ -6042,16 +5997,22 @@
               <a:buNone/>
             </a:pPr>
             <a:r>
-              <a:rPr lang="en-US" dirty="0"/>
+              <a:rPr lang="hu-HU" dirty="0"/>
               <a:t>}</a:t>
             </a:r>
+          </a:p>
+          <a:p>
+            <a:pPr marL="0" indent="0">
+              <a:buNone/>
+            </a:pPr>
+            <a:endParaRPr lang="en-US" dirty="0"/>
           </a:p>
         </p:txBody>
       </p:sp>
     </p:spTree>
     <p:extLst>
       <p:ext uri="{BB962C8B-B14F-4D97-AF65-F5344CB8AC3E}">
-        <p14:creationId xmlns:p14="http://schemas.microsoft.com/office/powerpoint/2010/main" val="1303954442"/>
+        <p14:creationId xmlns:p14="http://schemas.microsoft.com/office/powerpoint/2010/main" val="1628833876"/>
       </p:ext>
     </p:extLst>
   </p:cSld>
@@ -6094,6 +6055,230 @@
           <a:lstStyle/>
           <a:p>
             <a:r>
+              <a:rPr lang="en-US" sz="3200" dirty="0"/>
+              <a:t>Searches</a:t>
+            </a:r>
+          </a:p>
+        </p:txBody>
+      </p:sp>
+      <p:sp>
+        <p:nvSpPr>
+          <p:cNvPr id="3" name="Content Placeholder 2"/>
+          <p:cNvSpPr>
+            <a:spLocks noGrp="1"/>
+          </p:cNvSpPr>
+          <p:nvPr>
+            <p:ph idx="1"/>
+          </p:nvPr>
+        </p:nvSpPr>
+        <p:spPr/>
+        <p:txBody>
+          <a:bodyPr>
+            <a:normAutofit fontScale="70000" lnSpcReduction="20000"/>
+          </a:bodyPr>
+          <a:lstStyle/>
+          <a:p>
+            <a:pPr marL="0" indent="0">
+              <a:buNone/>
+            </a:pPr>
+            <a:r>
+              <a:rPr lang="en-US" dirty="0"/>
+              <a:t>{</a:t>
+            </a:r>
+          </a:p>
+          <a:p>
+            <a:pPr marL="0" indent="0">
+              <a:buNone/>
+            </a:pPr>
+            <a:r>
+              <a:rPr lang="en-US" dirty="0"/>
+              <a:t>    "</a:t>
+            </a:r>
+            <a:r>
+              <a:rPr lang="en-US" b="1" dirty="0"/>
+              <a:t>query</a:t>
+            </a:r>
+            <a:r>
+              <a:rPr lang="en-US" dirty="0"/>
+              <a:t>": {</a:t>
+            </a:r>
+          </a:p>
+          <a:p>
+            <a:pPr marL="0" indent="0">
+              <a:buNone/>
+            </a:pPr>
+            <a:r>
+              <a:rPr lang="en-US" dirty="0"/>
+              <a:t>        "</a:t>
+            </a:r>
+            <a:r>
+              <a:rPr lang="en-US" b="1" dirty="0"/>
+              <a:t>match</a:t>
+            </a:r>
+            <a:r>
+              <a:rPr lang="en-US" dirty="0"/>
+              <a:t>": {</a:t>
+            </a:r>
+          </a:p>
+          <a:p>
+            <a:pPr marL="0" indent="0">
+              <a:buNone/>
+            </a:pPr>
+            <a:r>
+              <a:rPr lang="en-US" dirty="0"/>
+              <a:t>           "title": {</a:t>
+            </a:r>
+          </a:p>
+          <a:p>
+            <a:pPr marL="0" indent="0">
+              <a:buNone/>
+            </a:pPr>
+            <a:r>
+              <a:rPr lang="en-US" dirty="0"/>
+              <a:t>                "</a:t>
+            </a:r>
+            <a:r>
+              <a:rPr lang="en-US" b="1" dirty="0"/>
+              <a:t>query</a:t>
+            </a:r>
+            <a:r>
+              <a:rPr lang="en-US" dirty="0"/>
+              <a:t>": "</a:t>
+            </a:r>
+            <a:r>
+              <a:rPr lang="en-US" dirty="0">
+                <a:solidFill>
+                  <a:schemeClr val="tx1"/>
+                </a:solidFill>
+              </a:rPr>
+              <a:t>Gas </a:t>
+            </a:r>
+            <a:r>
+              <a:rPr lang="en-US" dirty="0" err="1">
+                <a:solidFill>
+                  <a:schemeClr val="tx1"/>
+                </a:solidFill>
+              </a:rPr>
+              <a:t>Coiking</a:t>
+            </a:r>
+            <a:r>
+              <a:rPr lang="en-US" dirty="0"/>
+              <a:t>",</a:t>
+            </a:r>
+          </a:p>
+          <a:p>
+            <a:pPr marL="0" indent="0">
+              <a:buNone/>
+            </a:pPr>
+            <a:r>
+              <a:rPr lang="en-US" dirty="0"/>
+              <a:t>              </a:t>
+            </a:r>
+            <a:r>
+              <a:rPr lang="en-US"/>
+              <a:t>  "</a:t>
+            </a:r>
+            <a:r>
+              <a:rPr lang="en-US" b="1" dirty="0"/>
+              <a:t>fuzziness</a:t>
+            </a:r>
+            <a:r>
+              <a:rPr lang="en-US" dirty="0"/>
+              <a:t>": "</a:t>
+            </a:r>
+            <a:r>
+              <a:rPr lang="en-US" b="1" dirty="0"/>
+              <a:t>AUTO</a:t>
+            </a:r>
+            <a:r>
+              <a:rPr lang="en-US" dirty="0"/>
+              <a:t>"</a:t>
+            </a:r>
+          </a:p>
+          <a:p>
+            <a:pPr marL="0" indent="0">
+              <a:buNone/>
+            </a:pPr>
+            <a:r>
+              <a:rPr lang="en-US" dirty="0"/>
+              <a:t>           }</a:t>
+            </a:r>
+          </a:p>
+          <a:p>
+            <a:pPr marL="0" indent="0">
+              <a:buNone/>
+            </a:pPr>
+            <a:r>
+              <a:rPr lang="en-US" dirty="0"/>
+              <a:t>        }</a:t>
+            </a:r>
+          </a:p>
+          <a:p>
+            <a:pPr marL="0" indent="0">
+              <a:buNone/>
+            </a:pPr>
+            <a:r>
+              <a:rPr lang="en-US" dirty="0"/>
+              <a:t>    }</a:t>
+            </a:r>
+          </a:p>
+          <a:p>
+            <a:pPr marL="0" indent="0">
+              <a:buNone/>
+            </a:pPr>
+            <a:r>
+              <a:rPr lang="en-US" dirty="0"/>
+              <a:t>}</a:t>
+            </a:r>
+          </a:p>
+        </p:txBody>
+      </p:sp>
+    </p:spTree>
+    <p:extLst>
+      <p:ext uri="{BB962C8B-B14F-4D97-AF65-F5344CB8AC3E}">
+        <p14:creationId xmlns:p14="http://schemas.microsoft.com/office/powerpoint/2010/main" val="1303954442"/>
+      </p:ext>
+    </p:extLst>
+  </p:cSld>
+  <p:clrMapOvr>
+    <a:masterClrMapping/>
+  </p:clrMapOvr>
+</p:sld>
+</file>
+
+<file path=ppt/slides/slide23.xml><?xml version="1.0" encoding="utf-8"?>
+<p:sld xmlns:a="http://schemas.openxmlformats.org/drawingml/2006/main" xmlns:r="http://schemas.openxmlformats.org/officeDocument/2006/relationships" xmlns:p="http://schemas.openxmlformats.org/presentationml/2006/main">
+  <p:cSld>
+    <p:spTree>
+      <p:nvGrpSpPr>
+        <p:cNvPr id="1" name=""/>
+        <p:cNvGrpSpPr/>
+        <p:nvPr/>
+      </p:nvGrpSpPr>
+      <p:grpSpPr>
+        <a:xfrm>
+          <a:off x="0" y="0"/>
+          <a:ext cx="0" cy="0"/>
+          <a:chOff x="0" y="0"/>
+          <a:chExt cx="0" cy="0"/>
+        </a:xfrm>
+      </p:grpSpPr>
+      <p:sp>
+        <p:nvSpPr>
+          <p:cNvPr id="2" name="Title 1"/>
+          <p:cNvSpPr>
+            <a:spLocks noGrp="1"/>
+          </p:cNvSpPr>
+          <p:nvPr>
+            <p:ph type="title"/>
+          </p:nvPr>
+        </p:nvSpPr>
+        <p:spPr/>
+        <p:txBody>
+          <a:bodyPr/>
+          <a:lstStyle/>
+          <a:p>
+            <a:r>
               <a:rPr lang="en-US" dirty="0"/>
               <a:t>Nodes, shards, clusters, etc.</a:t>
             </a:r>
@@ -6113,7 +6298,7 @@
 </p:sld>
 </file>
 
-<file path=ppt/slides/slide23.xml><?xml version="1.0" encoding="utf-8"?>
+<file path=ppt/slides/slide24.xml><?xml version="1.0" encoding="utf-8"?>
 <p:sld xmlns:a="http://schemas.openxmlformats.org/drawingml/2006/main" xmlns:r="http://schemas.openxmlformats.org/officeDocument/2006/relationships" xmlns:p="http://schemas.openxmlformats.org/presentationml/2006/main">
   <p:cSld>
     <p:spTree>
@@ -6687,7 +6872,7 @@
 </p:sld>
 </file>
 
-<file path=ppt/slides/slide24.xml><?xml version="1.0" encoding="utf-8"?>
+<file path=ppt/slides/slide25.xml><?xml version="1.0" encoding="utf-8"?>
 <p:sld xmlns:a="http://schemas.openxmlformats.org/drawingml/2006/main" xmlns:r="http://schemas.openxmlformats.org/officeDocument/2006/relationships" xmlns:p="http://schemas.openxmlformats.org/presentationml/2006/main">
   <p:cSld>
     <p:spTree>

</xml_diff>